<commit_message>
Home page of presentation
</commit_message>
<xml_diff>
--- a/Presentation.pptx
+++ b/Presentation.pptx
@@ -2391,8 +2391,9 @@
     <p:bg>
       <p:bgPr>
         <a:solidFill>
-          <a:schemeClr val="bg1">
-            <a:alpha val="100000"/>
+          <a:schemeClr val="accent4">
+            <a:lumMod val="75000"/>
+            <a:lumOff val="25000"/>
           </a:schemeClr>
         </a:solidFill>
         <a:effectLst/>
@@ -3016,14 +3017,6 @@
 <file path=ppt/slides/slide1.xml><?xml version="1.0" encoding="utf-8"?>
 <p:sld xmlns:a="http://schemas.openxmlformats.org/drawingml/2006/main" xmlns:r="http://schemas.openxmlformats.org/officeDocument/2006/relationships" xmlns:p="http://schemas.openxmlformats.org/presentationml/2006/main">
   <p:cSld>
-    <p:bg>
-      <p:bgPr>
-        <a:solidFill>
-          <a:schemeClr val="bg2"/>
-        </a:solidFill>
-        <a:effectLst/>
-      </p:bgPr>
-    </p:bg>
     <p:spTree>
       <p:nvGrpSpPr>
         <p:cNvPr id="1" name=""/>
@@ -3033,40 +3026,455 @@
       <p:grpSpPr/>
       <p:sp>
         <p:nvSpPr>
-          <p:cNvPr id="2" name="Title 1"/>
-          <p:cNvSpPr>
-            <a:spLocks noGrp="1"/>
-          </p:cNvSpPr>
-          <p:nvPr>
-            <p:ph type="ctrTitle"/>
-          </p:nvPr>
-        </p:nvSpPr>
-        <p:spPr/>
-        <p:txBody>
-          <a:bodyPr/>
-          <a:p>
+          <p:cNvPr id="5" name="Flowchart: Terminator 4"/>
+          <p:cNvSpPr/>
+          <p:nvPr/>
+        </p:nvSpPr>
+        <p:spPr>
+          <a:xfrm rot="18540000">
+            <a:off x="4451350" y="736600"/>
+            <a:ext cx="5578475" cy="768985"/>
+          </a:xfrm>
+          <a:prstGeom prst="flowChartTerminator">
+            <a:avLst/>
+          </a:prstGeom>
+          <a:solidFill>
+            <a:srgbClr val="EBCED5"/>
+          </a:solidFill>
+          <a:ln>
+            <a:noFill/>
+          </a:ln>
+        </p:spPr>
+        <p:style>
+          <a:lnRef idx="2">
+            <a:schemeClr val="accent1">
+              <a:shade val="50000"/>
+            </a:schemeClr>
+          </a:lnRef>
+          <a:fillRef idx="1">
+            <a:schemeClr val="accent1"/>
+          </a:fillRef>
+          <a:effectRef idx="0">
+            <a:schemeClr val="accent1"/>
+          </a:effectRef>
+          <a:fontRef idx="minor">
+            <a:schemeClr val="lt1"/>
+          </a:fontRef>
+        </p:style>
+        <p:txBody>
+          <a:bodyPr rtlCol="0" anchor="ctr"/>
+          <a:p>
+            <a:pPr algn="ctr"/>
             <a:endParaRPr lang="en-US"/>
           </a:p>
         </p:txBody>
       </p:sp>
       <p:sp>
         <p:nvSpPr>
-          <p:cNvPr id="3" name="Subtitle 2"/>
-          <p:cNvSpPr>
-            <a:spLocks noGrp="1"/>
-          </p:cNvSpPr>
-          <p:nvPr>
-            <p:ph type="subTitle" idx="1"/>
-          </p:nvPr>
-        </p:nvSpPr>
-        <p:spPr/>
-        <p:txBody>
-          <a:bodyPr/>
-          <a:p>
+          <p:cNvPr id="6" name="Freeform 5"/>
+          <p:cNvSpPr/>
+          <p:nvPr/>
+        </p:nvSpPr>
+        <p:spPr>
+          <a:xfrm rot="18540000">
+            <a:off x="5878608" y="-57677"/>
+            <a:ext cx="8304458" cy="5076483"/>
+          </a:xfrm>
+          <a:custGeom>
+            <a:avLst/>
+            <a:gdLst>
+              <a:gd name="il" fmla="*/ w 1018 21600"/>
+              <a:gd name="ir" fmla="*/ w 20582 21600"/>
+              <a:gd name="it" fmla="*/ h 3163 21600"/>
+              <a:gd name="ib" fmla="*/ h 18437 21600"/>
+            </a:gdLst>
+            <a:ahLst/>
+            <a:cxnLst>
+              <a:cxn ang="3cd4">
+                <a:pos x="hc" y="t"/>
+              </a:cxn>
+              <a:cxn ang="cd2">
+                <a:pos x="l" y="vc"/>
+              </a:cxn>
+              <a:cxn ang="cd4">
+                <a:pos x="hc" y="b"/>
+              </a:cxn>
+              <a:cxn ang="0">
+                <a:pos x="r" y="vc"/>
+              </a:cxn>
+            </a:cxnLst>
+            <a:rect l="l" t="t" r="r" b="b"/>
+            <a:pathLst>
+              <a:path w="13078" h="7994">
+                <a:moveTo>
+                  <a:pt x="2125" y="0"/>
+                </a:moveTo>
+                <a:lnTo>
+                  <a:pt x="10229" y="0"/>
+                </a:lnTo>
+                <a:cubicBezTo>
+                  <a:pt x="11291" y="0"/>
+                  <a:pt x="12152" y="387"/>
+                  <a:pt x="12152" y="864"/>
+                </a:cubicBezTo>
+                <a:cubicBezTo>
+                  <a:pt x="12152" y="1340"/>
+                  <a:pt x="11291" y="1727"/>
+                  <a:pt x="10229" y="1727"/>
+                </a:cubicBezTo>
+                <a:lnTo>
+                  <a:pt x="2125" y="1727"/>
+                </a:lnTo>
+                <a:cubicBezTo>
+                  <a:pt x="1063" y="1727"/>
+                  <a:pt x="203" y="1340"/>
+                  <a:pt x="203" y="864"/>
+                </a:cubicBezTo>
+                <a:cubicBezTo>
+                  <a:pt x="203" y="387"/>
+                  <a:pt x="1063" y="0"/>
+                  <a:pt x="2125" y="0"/>
+                </a:cubicBezTo>
+                <a:close/>
+                <a:moveTo>
+                  <a:pt x="1944" y="1986"/>
+                </a:moveTo>
+                <a:lnTo>
+                  <a:pt x="10140" y="1986"/>
+                </a:lnTo>
+                <a:cubicBezTo>
+                  <a:pt x="11214" y="1986"/>
+                  <a:pt x="12084" y="2415"/>
+                  <a:pt x="12084" y="2944"/>
+                </a:cubicBezTo>
+                <a:cubicBezTo>
+                  <a:pt x="12084" y="3472"/>
+                  <a:pt x="11214" y="3901"/>
+                  <a:pt x="10140" y="3901"/>
+                </a:cubicBezTo>
+                <a:lnTo>
+                  <a:pt x="1944" y="3901"/>
+                </a:lnTo>
+                <a:cubicBezTo>
+                  <a:pt x="870" y="3901"/>
+                  <a:pt x="0" y="3472"/>
+                  <a:pt x="0" y="2944"/>
+                </a:cubicBezTo>
+                <a:cubicBezTo>
+                  <a:pt x="0" y="2415"/>
+                  <a:pt x="870" y="1986"/>
+                  <a:pt x="1944" y="1986"/>
+                </a:cubicBezTo>
+                <a:close/>
+                <a:moveTo>
+                  <a:pt x="2275" y="4270"/>
+                </a:moveTo>
+                <a:lnTo>
+                  <a:pt x="10189" y="4270"/>
+                </a:lnTo>
+                <a:cubicBezTo>
+                  <a:pt x="11226" y="4270"/>
+                  <a:pt x="12066" y="4592"/>
+                  <a:pt x="12066" y="4989"/>
+                </a:cubicBezTo>
+                <a:cubicBezTo>
+                  <a:pt x="12066" y="5386"/>
+                  <a:pt x="11226" y="5708"/>
+                  <a:pt x="10189" y="5708"/>
+                </a:cubicBezTo>
+                <a:lnTo>
+                  <a:pt x="2275" y="5708"/>
+                </a:lnTo>
+                <a:cubicBezTo>
+                  <a:pt x="1238" y="5708"/>
+                  <a:pt x="398" y="5386"/>
+                  <a:pt x="398" y="4989"/>
+                </a:cubicBezTo>
+                <a:cubicBezTo>
+                  <a:pt x="398" y="4592"/>
+                  <a:pt x="1238" y="4270"/>
+                  <a:pt x="2275" y="4270"/>
+                </a:cubicBezTo>
+                <a:close/>
+                <a:moveTo>
+                  <a:pt x="3287" y="6214"/>
+                </a:moveTo>
+                <a:lnTo>
+                  <a:pt x="11201" y="6214"/>
+                </a:lnTo>
+                <a:cubicBezTo>
+                  <a:pt x="12237" y="6214"/>
+                  <a:pt x="13078" y="6613"/>
+                  <a:pt x="13078" y="7104"/>
+                </a:cubicBezTo>
+                <a:cubicBezTo>
+                  <a:pt x="13078" y="7596"/>
+                  <a:pt x="12237" y="7994"/>
+                  <a:pt x="11201" y="7994"/>
+                </a:cubicBezTo>
+                <a:lnTo>
+                  <a:pt x="3287" y="7994"/>
+                </a:lnTo>
+                <a:cubicBezTo>
+                  <a:pt x="2250" y="7994"/>
+                  <a:pt x="1410" y="7596"/>
+                  <a:pt x="1410" y="7104"/>
+                </a:cubicBezTo>
+                <a:cubicBezTo>
+                  <a:pt x="1410" y="6613"/>
+                  <a:pt x="2250" y="6214"/>
+                  <a:pt x="3287" y="6214"/>
+                </a:cubicBezTo>
+                <a:close/>
+              </a:path>
+            </a:pathLst>
+          </a:custGeom>
+          <a:blipFill rotWithShape="1">
+            <a:blip r:embed="rId1"/>
+            <a:stretch>
+              <a:fillRect/>
+            </a:stretch>
+          </a:blipFill>
+          <a:ln>
+            <a:noFill/>
+          </a:ln>
+        </p:spPr>
+        <p:style>
+          <a:lnRef idx="2">
+            <a:schemeClr val="accent1">
+              <a:shade val="50000"/>
+            </a:schemeClr>
+          </a:lnRef>
+          <a:fillRef idx="1">
+            <a:schemeClr val="accent1"/>
+          </a:fillRef>
+          <a:effectRef idx="0">
+            <a:schemeClr val="accent1"/>
+          </a:effectRef>
+          <a:fontRef idx="minor">
+            <a:schemeClr val="lt1"/>
+          </a:fontRef>
+        </p:style>
+        <p:txBody>
+          <a:bodyPr wrap="square" rtlCol="0" anchor="ctr">
+            <a:noAutofit/>
+          </a:bodyPr>
+          <a:p>
+            <a:pPr algn="ctr"/>
             <a:endParaRPr lang="en-US"/>
           </a:p>
         </p:txBody>
       </p:sp>
+      <p:sp>
+        <p:nvSpPr>
+          <p:cNvPr id="10" name="Rectangles 9"/>
+          <p:cNvSpPr/>
+          <p:nvPr/>
+        </p:nvSpPr>
+        <p:spPr>
+          <a:xfrm>
+            <a:off x="-8890" y="-26035"/>
+            <a:ext cx="12299950" cy="175260"/>
+          </a:xfrm>
+          <a:prstGeom prst="rect">
+            <a:avLst/>
+          </a:prstGeom>
+          <a:solidFill>
+            <a:schemeClr val="accent4">
+              <a:lumMod val="75000"/>
+              <a:lumOff val="25000"/>
+            </a:schemeClr>
+          </a:solidFill>
+          <a:ln>
+            <a:noFill/>
+          </a:ln>
+        </p:spPr>
+        <p:style>
+          <a:lnRef idx="2">
+            <a:schemeClr val="accent1">
+              <a:shade val="50000"/>
+            </a:schemeClr>
+          </a:lnRef>
+          <a:fillRef idx="1">
+            <a:schemeClr val="accent1"/>
+          </a:fillRef>
+          <a:effectRef idx="0">
+            <a:schemeClr val="accent1"/>
+          </a:effectRef>
+          <a:fontRef idx="minor">
+            <a:schemeClr val="lt1"/>
+          </a:fontRef>
+        </p:style>
+        <p:txBody>
+          <a:bodyPr rtlCol="0" anchor="ctr"/>
+          <a:p>
+            <a:pPr algn="ctr"/>
+            <a:endParaRPr lang="en-US"/>
+          </a:p>
+        </p:txBody>
+      </p:sp>
+      <p:sp>
+        <p:nvSpPr>
+          <p:cNvPr id="11" name="Rectangles 10"/>
+          <p:cNvSpPr/>
+          <p:nvPr/>
+        </p:nvSpPr>
+        <p:spPr>
+          <a:xfrm rot="5400000">
+            <a:off x="5954395" y="6036310"/>
+            <a:ext cx="12299950" cy="175260"/>
+          </a:xfrm>
+          <a:prstGeom prst="rect">
+            <a:avLst/>
+          </a:prstGeom>
+          <a:solidFill>
+            <a:schemeClr val="accent4">
+              <a:lumMod val="75000"/>
+              <a:lumOff val="25000"/>
+            </a:schemeClr>
+          </a:solidFill>
+          <a:ln>
+            <a:noFill/>
+          </a:ln>
+        </p:spPr>
+        <p:style>
+          <a:lnRef idx="2">
+            <a:schemeClr val="accent1">
+              <a:shade val="50000"/>
+            </a:schemeClr>
+          </a:lnRef>
+          <a:fillRef idx="1">
+            <a:schemeClr val="accent1"/>
+          </a:fillRef>
+          <a:effectRef idx="0">
+            <a:schemeClr val="accent1"/>
+          </a:effectRef>
+          <a:fontRef idx="minor">
+            <a:schemeClr val="lt1"/>
+          </a:fontRef>
+        </p:style>
+        <p:txBody>
+          <a:bodyPr rtlCol="0" anchor="ctr"/>
+          <a:p>
+            <a:pPr algn="ctr"/>
+            <a:endParaRPr lang="en-US"/>
+          </a:p>
+        </p:txBody>
+      </p:sp>
+      <p:sp>
+        <p:nvSpPr>
+          <p:cNvPr id="12" name="Rectangles 11"/>
+          <p:cNvSpPr/>
+          <p:nvPr/>
+        </p:nvSpPr>
+        <p:spPr>
+          <a:xfrm>
+            <a:off x="-53975" y="6682740"/>
+            <a:ext cx="12299950" cy="175260"/>
+          </a:xfrm>
+          <a:prstGeom prst="rect">
+            <a:avLst/>
+          </a:prstGeom>
+          <a:solidFill>
+            <a:schemeClr val="accent4">
+              <a:lumMod val="75000"/>
+              <a:lumOff val="25000"/>
+            </a:schemeClr>
+          </a:solidFill>
+          <a:ln>
+            <a:noFill/>
+          </a:ln>
+        </p:spPr>
+        <p:style>
+          <a:lnRef idx="2">
+            <a:schemeClr val="accent1">
+              <a:shade val="50000"/>
+            </a:schemeClr>
+          </a:lnRef>
+          <a:fillRef idx="1">
+            <a:schemeClr val="accent1"/>
+          </a:fillRef>
+          <a:effectRef idx="0">
+            <a:schemeClr val="accent1"/>
+          </a:effectRef>
+          <a:fontRef idx="minor">
+            <a:schemeClr val="lt1"/>
+          </a:fontRef>
+        </p:style>
+        <p:txBody>
+          <a:bodyPr rtlCol="0" anchor="ctr"/>
+          <a:p>
+            <a:pPr algn="ctr"/>
+            <a:endParaRPr lang="en-US"/>
+          </a:p>
+        </p:txBody>
+      </p:sp>
+      <p:pic>
+        <p:nvPicPr>
+          <p:cNvPr id="16" name="Picture 15" descr="one-step-logo"/>
+          <p:cNvPicPr>
+            <a:picLocks noChangeAspect="1"/>
+          </p:cNvPicPr>
+          <p:nvPr/>
+        </p:nvPicPr>
+        <p:blipFill>
+          <a:blip r:embed="rId2"/>
+          <a:stretch>
+            <a:fillRect/>
+          </a:stretch>
+        </p:blipFill>
+        <p:spPr>
+          <a:xfrm>
+            <a:off x="1891030" y="5990590"/>
+            <a:ext cx="1266825" cy="483870"/>
+          </a:xfrm>
+          <a:prstGeom prst="rect">
+            <a:avLst/>
+          </a:prstGeom>
+        </p:spPr>
+      </p:pic>
+      <p:pic>
+        <p:nvPicPr>
+          <p:cNvPr id="17" name="Picture 3" descr="Description: \\MICROSERVER\Mediastore\My Documents\My Documents\Logical View\Branding\Logo White.png"/>
+          <p:cNvPicPr>
+            <a:picLocks noChangeAspect="1" noChangeArrowheads="1"/>
+          </p:cNvPicPr>
+          <p:nvPr/>
+        </p:nvPicPr>
+        <p:blipFill>
+          <a:blip r:embed="rId3">
+            <a:clrChange>
+              <a:clrFrom>
+                <a:srgbClr val="FFFFFF"/>
+              </a:clrFrom>
+              <a:clrTo>
+                <a:srgbClr val="FFFFFF">
+                  <a:alpha val="0"/>
+                </a:srgbClr>
+              </a:clrTo>
+            </a:clrChange>
+            <a:extLst>
+              <a:ext uri="{28A0092B-C50C-407E-A947-70E740481C1C}">
+                <a14:useLocalDpi xmlns:a14="http://schemas.microsoft.com/office/drawing/2010/main" val="0"/>
+              </a:ext>
+            </a:extLst>
+          </a:blip>
+          <a:srcRect/>
+          <a:stretch>
+            <a:fillRect/>
+          </a:stretch>
+        </p:blipFill>
+        <p:spPr>
+          <a:xfrm>
+            <a:off x="148590" y="5866765"/>
+            <a:ext cx="1531620" cy="731520"/>
+          </a:xfrm>
+          <a:prstGeom prst="rect">
+            <a:avLst/>
+          </a:prstGeom>
+          <a:noFill/>
+        </p:spPr>
+      </p:pic>
     </p:spTree>
   </p:cSld>
   <p:clrMapOvr>

</xml_diff>

<commit_message>
New slide and added a template
</commit_message>
<xml_diff>
--- a/Presentation.pptx
+++ b/Presentation.pptx
@@ -4,8 +4,13 @@
   <p:sldMasterIdLst>
     <p:sldMasterId id="2147483648" r:id="rId1"/>
   </p:sldMasterIdLst>
+  <p:notesMasterIdLst>
+    <p:notesMasterId r:id="rId4"/>
+  </p:notesMasterIdLst>
   <p:sldIdLst>
-    <p:sldId id="256" r:id="rId3"/>
+    <p:sldId id="257" r:id="rId3"/>
+    <p:sldId id="256" r:id="rId5"/>
+    <p:sldId id="258" r:id="rId6"/>
   </p:sldIdLst>
   <p:sldSz cx="12192000" cy="6858000"/>
   <p:notesSz cx="6858000" cy="9144000"/>
@@ -105,6 +110,447 @@
     </a:lvl9pPr>
   </p:defaultTextStyle>
 </p:presentation>
+</file>
+
+<file path=ppt/commentAuthors.xml><?xml version="1.0" encoding="utf-8"?>
+<p:cmAuthorLst xmlns:a="http://schemas.openxmlformats.org/drawingml/2006/main" xmlns:r="http://schemas.openxmlformats.org/officeDocument/2006/relationships" xmlns:p="http://schemas.openxmlformats.org/presentationml/2006/main">
+  <p:cmAuthor id="1" name="lilith" initials="l" lastIdx="1" clrIdx="0"/>
+</p:cmAuthorLst>
+</file>
+
+<file path=ppt/notesMasters/notesMaster1.xml><?xml version="1.0" encoding="utf-8"?>
+<p:notesMaster xmlns:a="http://schemas.openxmlformats.org/drawingml/2006/main" xmlns:r="http://schemas.openxmlformats.org/officeDocument/2006/relationships" xmlns:p="http://schemas.openxmlformats.org/presentationml/2006/main">
+  <p:cSld>
+    <p:bg>
+      <p:bgRef idx="1001">
+        <a:schemeClr val="bg1"/>
+      </p:bgRef>
+    </p:bg>
+    <p:spTree>
+      <p:nvGrpSpPr>
+        <p:cNvPr id="1" name=""/>
+        <p:cNvGrpSpPr/>
+        <p:nvPr/>
+      </p:nvGrpSpPr>
+      <p:grpSpPr>
+        <a:xfrm>
+          <a:off x="0" y="0"/>
+          <a:ext cx="0" cy="0"/>
+          <a:chOff x="0" y="0"/>
+          <a:chExt cx="0" cy="0"/>
+        </a:xfrm>
+      </p:grpSpPr>
+      <p:sp>
+        <p:nvSpPr>
+          <p:cNvPr id="2" name="Header Placeholder 1"/>
+          <p:cNvSpPr>
+            <a:spLocks noGrp="1"/>
+          </p:cNvSpPr>
+          <p:nvPr>
+            <p:ph type="hdr" sz="quarter"/>
+          </p:nvPr>
+        </p:nvSpPr>
+        <p:spPr>
+          <a:xfrm>
+            <a:off x="0" y="0"/>
+            <a:ext cx="2971800" cy="458788"/>
+          </a:xfrm>
+          <a:prstGeom prst="rect">
+            <a:avLst/>
+          </a:prstGeom>
+        </p:spPr>
+        <p:txBody>
+          <a:bodyPr vert="horz" lIns="91440" tIns="45720" rIns="91440" bIns="45720" rtlCol="0"/>
+          <a:lstStyle>
+            <a:lvl1pPr algn="l">
+              <a:defRPr sz="1200"/>
+            </a:lvl1pPr>
+          </a:lstStyle>
+          <a:p>
+            <a:endParaRPr lang="en-US"/>
+          </a:p>
+        </p:txBody>
+      </p:sp>
+      <p:sp>
+        <p:nvSpPr>
+          <p:cNvPr id="3" name="Date Placeholder 2"/>
+          <p:cNvSpPr>
+            <a:spLocks noGrp="1"/>
+          </p:cNvSpPr>
+          <p:nvPr>
+            <p:ph type="dt" idx="1"/>
+          </p:nvPr>
+        </p:nvSpPr>
+        <p:spPr>
+          <a:xfrm>
+            <a:off x="3884613" y="0"/>
+            <a:ext cx="2971800" cy="458788"/>
+          </a:xfrm>
+          <a:prstGeom prst="rect">
+            <a:avLst/>
+          </a:prstGeom>
+        </p:spPr>
+        <p:txBody>
+          <a:bodyPr vert="horz" lIns="91440" tIns="45720" rIns="91440" bIns="45720" rtlCol="0"/>
+          <a:lstStyle>
+            <a:lvl1pPr algn="r">
+              <a:defRPr sz="1200"/>
+            </a:lvl1pPr>
+          </a:lstStyle>
+          <a:p>
+            <a:fld id="{3EFD42F7-718C-4B98-AAEC-167E6DDD60A7}" type="datetimeFigureOut">
+              <a:rPr lang="en-US" smtClean="0"/>
+            </a:fld>
+            <a:endParaRPr lang="en-US"/>
+          </a:p>
+        </p:txBody>
+      </p:sp>
+      <p:sp>
+        <p:nvSpPr>
+          <p:cNvPr id="4" name="Slide Image Placeholder 3"/>
+          <p:cNvSpPr>
+            <a:spLocks noGrp="1" noRot="1" noChangeAspect="1"/>
+          </p:cNvSpPr>
+          <p:nvPr>
+            <p:ph type="sldImg" idx="2"/>
+          </p:nvPr>
+        </p:nvSpPr>
+        <p:spPr>
+          <a:xfrm>
+            <a:off x="685800" y="1143000"/>
+            <a:ext cx="5486400" cy="3086100"/>
+          </a:xfrm>
+          <a:prstGeom prst="rect">
+            <a:avLst/>
+          </a:prstGeom>
+          <a:noFill/>
+          <a:ln w="12700">
+            <a:solidFill>
+              <a:prstClr val="black"/>
+            </a:solidFill>
+          </a:ln>
+        </p:spPr>
+        <p:txBody>
+          <a:bodyPr vert="horz" lIns="91440" tIns="45720" rIns="91440" bIns="45720" rtlCol="0" anchor="ctr"/>
+          <a:lstStyle/>
+          <a:p>
+            <a:endParaRPr lang="en-US"/>
+          </a:p>
+        </p:txBody>
+      </p:sp>
+      <p:sp>
+        <p:nvSpPr>
+          <p:cNvPr id="5" name="Notes Placeholder 4"/>
+          <p:cNvSpPr>
+            <a:spLocks noGrp="1"/>
+          </p:cNvSpPr>
+          <p:nvPr>
+            <p:ph type="body" sz="quarter" idx="3"/>
+          </p:nvPr>
+        </p:nvSpPr>
+        <p:spPr>
+          <a:xfrm>
+            <a:off x="685800" y="4400550"/>
+            <a:ext cx="5486400" cy="3600450"/>
+          </a:xfrm>
+          <a:prstGeom prst="rect">
+            <a:avLst/>
+          </a:prstGeom>
+        </p:spPr>
+        <p:txBody>
+          <a:bodyPr vert="horz" lIns="91440" tIns="45720" rIns="91440" bIns="45720" rtlCol="0"/>
+          <a:lstStyle/>
+          <a:p>
+            <a:pPr lvl="0"/>
+            <a:r>
+              <a:rPr lang="en-US" smtClean="0"/>
+              <a:t>Click to edit Master text styles</a:t>
+            </a:r>
+            <a:endParaRPr lang="en-US" smtClean="0"/>
+          </a:p>
+          <a:p>
+            <a:pPr lvl="1"/>
+            <a:r>
+              <a:rPr lang="en-US" smtClean="0"/>
+              <a:t>Second level</a:t>
+            </a:r>
+            <a:endParaRPr lang="en-US" smtClean="0"/>
+          </a:p>
+          <a:p>
+            <a:pPr lvl="2"/>
+            <a:r>
+              <a:rPr lang="en-US" smtClean="0"/>
+              <a:t>Third level</a:t>
+            </a:r>
+            <a:endParaRPr lang="en-US" smtClean="0"/>
+          </a:p>
+          <a:p>
+            <a:pPr lvl="3"/>
+            <a:r>
+              <a:rPr lang="en-US" smtClean="0"/>
+              <a:t>Fourth level</a:t>
+            </a:r>
+            <a:endParaRPr lang="en-US" smtClean="0"/>
+          </a:p>
+          <a:p>
+            <a:pPr lvl="4"/>
+            <a:r>
+              <a:rPr lang="en-US" smtClean="0"/>
+              <a:t>Fifth level</a:t>
+            </a:r>
+            <a:endParaRPr lang="en-US"/>
+          </a:p>
+        </p:txBody>
+      </p:sp>
+      <p:sp>
+        <p:nvSpPr>
+          <p:cNvPr id="6" name="Footer Placeholder 5"/>
+          <p:cNvSpPr>
+            <a:spLocks noGrp="1"/>
+          </p:cNvSpPr>
+          <p:nvPr>
+            <p:ph type="ftr" sz="quarter" idx="4"/>
+          </p:nvPr>
+        </p:nvSpPr>
+        <p:spPr>
+          <a:xfrm>
+            <a:off x="0" y="8685213"/>
+            <a:ext cx="2971800" cy="458787"/>
+          </a:xfrm>
+          <a:prstGeom prst="rect">
+            <a:avLst/>
+          </a:prstGeom>
+        </p:spPr>
+        <p:txBody>
+          <a:bodyPr vert="horz" lIns="91440" tIns="45720" rIns="91440" bIns="45720" rtlCol="0" anchor="b"/>
+          <a:lstStyle>
+            <a:lvl1pPr algn="l">
+              <a:defRPr sz="1200"/>
+            </a:lvl1pPr>
+          </a:lstStyle>
+          <a:p>
+            <a:endParaRPr lang="en-US"/>
+          </a:p>
+        </p:txBody>
+      </p:sp>
+      <p:sp>
+        <p:nvSpPr>
+          <p:cNvPr id="7" name="Slide Number Placeholder 6"/>
+          <p:cNvSpPr>
+            <a:spLocks noGrp="1"/>
+          </p:cNvSpPr>
+          <p:nvPr>
+            <p:ph type="sldNum" sz="quarter" idx="5"/>
+          </p:nvPr>
+        </p:nvSpPr>
+        <p:spPr>
+          <a:xfrm>
+            <a:off x="3884613" y="8685213"/>
+            <a:ext cx="2971800" cy="458787"/>
+          </a:xfrm>
+          <a:prstGeom prst="rect">
+            <a:avLst/>
+          </a:prstGeom>
+        </p:spPr>
+        <p:txBody>
+          <a:bodyPr vert="horz" lIns="91440" tIns="45720" rIns="91440" bIns="45720" rtlCol="0" anchor="b"/>
+          <a:lstStyle>
+            <a:lvl1pPr algn="r">
+              <a:defRPr sz="1200"/>
+            </a:lvl1pPr>
+          </a:lstStyle>
+          <a:p>
+            <a:fld id="{21B2AA4F-B828-4D7C-AFD3-893933DAFCB4}" type="slidenum">
+              <a:rPr lang="en-US" smtClean="0"/>
+            </a:fld>
+            <a:endParaRPr lang="en-US"/>
+          </a:p>
+        </p:txBody>
+      </p:sp>
+    </p:spTree>
+  </p:cSld>
+  <p:clrMap bg1="lt1" tx1="dk1" bg2="lt2" tx2="dk2" accent1="accent1" accent2="accent2" accent3="accent3" accent4="accent4" accent5="accent5" accent6="accent6" hlink="hlink" folHlink="folHlink"/>
+  <p:notesStyle>
+    <a:lvl1pPr marL="0" algn="l" defTabSz="914400" rtl="0" eaLnBrk="1" latinLnBrk="0" hangingPunct="1">
+      <a:defRPr sz="1200" kern="1200">
+        <a:solidFill>
+          <a:schemeClr val="tx1"/>
+        </a:solidFill>
+        <a:latin typeface="+mn-lt"/>
+        <a:ea typeface="+mn-ea"/>
+        <a:cs typeface="+mn-cs"/>
+      </a:defRPr>
+    </a:lvl1pPr>
+    <a:lvl2pPr marL="457200" algn="l" defTabSz="914400" rtl="0" eaLnBrk="1" latinLnBrk="0" hangingPunct="1">
+      <a:defRPr sz="1200" kern="1200">
+        <a:solidFill>
+          <a:schemeClr val="tx1"/>
+        </a:solidFill>
+        <a:latin typeface="+mn-lt"/>
+        <a:ea typeface="+mn-ea"/>
+        <a:cs typeface="+mn-cs"/>
+      </a:defRPr>
+    </a:lvl2pPr>
+    <a:lvl3pPr marL="914400" algn="l" defTabSz="914400" rtl="0" eaLnBrk="1" latinLnBrk="0" hangingPunct="1">
+      <a:defRPr sz="1200" kern="1200">
+        <a:solidFill>
+          <a:schemeClr val="tx1"/>
+        </a:solidFill>
+        <a:latin typeface="+mn-lt"/>
+        <a:ea typeface="+mn-ea"/>
+        <a:cs typeface="+mn-cs"/>
+      </a:defRPr>
+    </a:lvl3pPr>
+    <a:lvl4pPr marL="1371600" algn="l" defTabSz="914400" rtl="0" eaLnBrk="1" latinLnBrk="0" hangingPunct="1">
+      <a:defRPr sz="1200" kern="1200">
+        <a:solidFill>
+          <a:schemeClr val="tx1"/>
+        </a:solidFill>
+        <a:latin typeface="+mn-lt"/>
+        <a:ea typeface="+mn-ea"/>
+        <a:cs typeface="+mn-cs"/>
+      </a:defRPr>
+    </a:lvl4pPr>
+    <a:lvl5pPr marL="1828800" algn="l" defTabSz="914400" rtl="0" eaLnBrk="1" latinLnBrk="0" hangingPunct="1">
+      <a:defRPr sz="1200" kern="1200">
+        <a:solidFill>
+          <a:schemeClr val="tx1"/>
+        </a:solidFill>
+        <a:latin typeface="+mn-lt"/>
+        <a:ea typeface="+mn-ea"/>
+        <a:cs typeface="+mn-cs"/>
+      </a:defRPr>
+    </a:lvl5pPr>
+    <a:lvl6pPr marL="2286000" algn="l" defTabSz="914400" rtl="0" eaLnBrk="1" latinLnBrk="0" hangingPunct="1">
+      <a:defRPr sz="1200" kern="1200">
+        <a:solidFill>
+          <a:schemeClr val="tx1"/>
+        </a:solidFill>
+        <a:latin typeface="+mn-lt"/>
+        <a:ea typeface="+mn-ea"/>
+        <a:cs typeface="+mn-cs"/>
+      </a:defRPr>
+    </a:lvl6pPr>
+    <a:lvl7pPr marL="2743200" algn="l" defTabSz="914400" rtl="0" eaLnBrk="1" latinLnBrk="0" hangingPunct="1">
+      <a:defRPr sz="1200" kern="1200">
+        <a:solidFill>
+          <a:schemeClr val="tx1"/>
+        </a:solidFill>
+        <a:latin typeface="+mn-lt"/>
+        <a:ea typeface="+mn-ea"/>
+        <a:cs typeface="+mn-cs"/>
+      </a:defRPr>
+    </a:lvl7pPr>
+    <a:lvl8pPr marL="3200400" algn="l" defTabSz="914400" rtl="0" eaLnBrk="1" latinLnBrk="0" hangingPunct="1">
+      <a:defRPr sz="1200" kern="1200">
+        <a:solidFill>
+          <a:schemeClr val="tx1"/>
+        </a:solidFill>
+        <a:latin typeface="+mn-lt"/>
+        <a:ea typeface="+mn-ea"/>
+        <a:cs typeface="+mn-cs"/>
+      </a:defRPr>
+    </a:lvl8pPr>
+    <a:lvl9pPr marL="3657600" algn="l" defTabSz="914400" rtl="0" eaLnBrk="1" latinLnBrk="0" hangingPunct="1">
+      <a:defRPr sz="1200" kern="1200">
+        <a:solidFill>
+          <a:schemeClr val="tx1"/>
+        </a:solidFill>
+        <a:latin typeface="+mn-lt"/>
+        <a:ea typeface="+mn-ea"/>
+        <a:cs typeface="+mn-cs"/>
+      </a:defRPr>
+    </a:lvl9pPr>
+  </p:notesStyle>
+</p:notesMaster>
+</file>
+
+<file path=ppt/notesSlides/notesSlide1.xml><?xml version="1.0" encoding="utf-8"?>
+<p:notes xmlns:a="http://schemas.openxmlformats.org/drawingml/2006/main" xmlns:r="http://schemas.openxmlformats.org/officeDocument/2006/relationships" xmlns:p="http://schemas.openxmlformats.org/presentationml/2006/main">
+  <p:cSld>
+    <p:spTree>
+      <p:nvGrpSpPr>
+        <p:cNvPr id="1" name=""/>
+        <p:cNvGrpSpPr/>
+        <p:nvPr/>
+      </p:nvGrpSpPr>
+      <p:grpSpPr/>
+      <p:sp>
+        <p:nvSpPr>
+          <p:cNvPr id="2" name="Slide Image Placeholder 1"/>
+          <p:cNvSpPr/>
+          <p:nvPr>
+            <p:ph type="sldImg" idx="2"/>
+          </p:nvPr>
+        </p:nvSpPr>
+        <p:spPr/>
+      </p:sp>
+      <p:sp>
+        <p:nvSpPr>
+          <p:cNvPr id="3" name="Text Placeholder 2"/>
+          <p:cNvSpPr/>
+          <p:nvPr>
+            <p:ph type="body" idx="3"/>
+          </p:nvPr>
+        </p:nvSpPr>
+        <p:spPr/>
+        <p:txBody>
+          <a:bodyPr/>
+          <a:p>
+            <a:endParaRPr lang="en-US"/>
+          </a:p>
+        </p:txBody>
+      </p:sp>
+    </p:spTree>
+  </p:cSld>
+  <p:clrMapOvr>
+    <a:masterClrMapping/>
+  </p:clrMapOvr>
+</p:notes>
+</file>
+
+<file path=ppt/notesSlides/notesSlide2.xml><?xml version="1.0" encoding="utf-8"?>
+<p:notes xmlns:a="http://schemas.openxmlformats.org/drawingml/2006/main" xmlns:r="http://schemas.openxmlformats.org/officeDocument/2006/relationships" xmlns:p="http://schemas.openxmlformats.org/presentationml/2006/main">
+  <p:cSld>
+    <p:spTree>
+      <p:nvGrpSpPr>
+        <p:cNvPr id="1" name=""/>
+        <p:cNvGrpSpPr/>
+        <p:nvPr/>
+      </p:nvGrpSpPr>
+      <p:grpSpPr/>
+      <p:sp>
+        <p:nvSpPr>
+          <p:cNvPr id="2" name="Slide Image Placeholder 1"/>
+          <p:cNvSpPr/>
+          <p:nvPr>
+            <p:ph type="sldImg" idx="2"/>
+          </p:nvPr>
+        </p:nvSpPr>
+        <p:spPr/>
+      </p:sp>
+      <p:sp>
+        <p:nvSpPr>
+          <p:cNvPr id="3" name="Text Placeholder 2"/>
+          <p:cNvSpPr/>
+          <p:nvPr>
+            <p:ph type="body" idx="3"/>
+          </p:nvPr>
+        </p:nvSpPr>
+        <p:spPr/>
+        <p:txBody>
+          <a:bodyPr/>
+          <a:p>
+            <a:endParaRPr lang="en-US"/>
+          </a:p>
+        </p:txBody>
+      </p:sp>
+    </p:spTree>
+  </p:cSld>
+  <p:clrMapOvr>
+    <a:masterClrMapping/>
+  </p:clrMapOvr>
+</p:notes>
 </file>
 
 <file path=ppt/slideLayouts/slideLayout1.xml><?xml version="1.0" encoding="utf-8"?>
@@ -3015,6 +3461,235 @@
 </file>
 
 <file path=ppt/slides/slide1.xml><?xml version="1.0" encoding="utf-8"?>
+<p:sld xmlns:a="http://schemas.openxmlformats.org/drawingml/2006/main" xmlns:r="http://schemas.openxmlformats.org/officeDocument/2006/relationships" xmlns:p="http://schemas.openxmlformats.org/presentationml/2006/main" show="0">
+  <p:cSld>
+    <p:spTree>
+      <p:nvGrpSpPr>
+        <p:cNvPr id="1" name=""/>
+        <p:cNvGrpSpPr/>
+        <p:nvPr/>
+      </p:nvGrpSpPr>
+      <p:grpSpPr/>
+      <p:sp>
+        <p:nvSpPr>
+          <p:cNvPr id="10" name="Rectangles 9"/>
+          <p:cNvSpPr/>
+          <p:nvPr/>
+        </p:nvSpPr>
+        <p:spPr>
+          <a:xfrm>
+            <a:off x="-8890" y="-26035"/>
+            <a:ext cx="12299950" cy="175260"/>
+          </a:xfrm>
+          <a:prstGeom prst="rect">
+            <a:avLst/>
+          </a:prstGeom>
+          <a:solidFill>
+            <a:schemeClr val="accent4">
+              <a:lumMod val="75000"/>
+              <a:lumOff val="25000"/>
+            </a:schemeClr>
+          </a:solidFill>
+          <a:ln>
+            <a:noFill/>
+          </a:ln>
+        </p:spPr>
+        <p:style>
+          <a:lnRef idx="2">
+            <a:schemeClr val="accent1">
+              <a:shade val="50000"/>
+            </a:schemeClr>
+          </a:lnRef>
+          <a:fillRef idx="1">
+            <a:schemeClr val="accent1"/>
+          </a:fillRef>
+          <a:effectRef idx="0">
+            <a:schemeClr val="accent1"/>
+          </a:effectRef>
+          <a:fontRef idx="minor">
+            <a:schemeClr val="lt1"/>
+          </a:fontRef>
+        </p:style>
+        <p:txBody>
+          <a:bodyPr rtlCol="0" anchor="ctr"/>
+          <a:p>
+            <a:pPr algn="ctr"/>
+            <a:endParaRPr lang="en-US"/>
+          </a:p>
+        </p:txBody>
+      </p:sp>
+      <p:sp>
+        <p:nvSpPr>
+          <p:cNvPr id="11" name="Rectangles 10"/>
+          <p:cNvSpPr/>
+          <p:nvPr/>
+        </p:nvSpPr>
+        <p:spPr>
+          <a:xfrm rot="5400000">
+            <a:off x="5954395" y="6036310"/>
+            <a:ext cx="12299950" cy="175260"/>
+          </a:xfrm>
+          <a:prstGeom prst="rect">
+            <a:avLst/>
+          </a:prstGeom>
+          <a:solidFill>
+            <a:schemeClr val="accent4">
+              <a:lumMod val="75000"/>
+              <a:lumOff val="25000"/>
+            </a:schemeClr>
+          </a:solidFill>
+          <a:ln>
+            <a:noFill/>
+          </a:ln>
+        </p:spPr>
+        <p:style>
+          <a:lnRef idx="2">
+            <a:schemeClr val="accent1">
+              <a:shade val="50000"/>
+            </a:schemeClr>
+          </a:lnRef>
+          <a:fillRef idx="1">
+            <a:schemeClr val="accent1"/>
+          </a:fillRef>
+          <a:effectRef idx="0">
+            <a:schemeClr val="accent1"/>
+          </a:effectRef>
+          <a:fontRef idx="minor">
+            <a:schemeClr val="lt1"/>
+          </a:fontRef>
+        </p:style>
+        <p:txBody>
+          <a:bodyPr rtlCol="0" anchor="ctr"/>
+          <a:p>
+            <a:pPr algn="ctr"/>
+            <a:endParaRPr lang="en-US"/>
+          </a:p>
+        </p:txBody>
+      </p:sp>
+      <p:sp>
+        <p:nvSpPr>
+          <p:cNvPr id="12" name="Rectangles 11"/>
+          <p:cNvSpPr/>
+          <p:nvPr/>
+        </p:nvSpPr>
+        <p:spPr>
+          <a:xfrm>
+            <a:off x="-53975" y="6682740"/>
+            <a:ext cx="12299950" cy="175260"/>
+          </a:xfrm>
+          <a:prstGeom prst="rect">
+            <a:avLst/>
+          </a:prstGeom>
+          <a:solidFill>
+            <a:schemeClr val="accent4">
+              <a:lumMod val="75000"/>
+              <a:lumOff val="25000"/>
+            </a:schemeClr>
+          </a:solidFill>
+          <a:ln>
+            <a:noFill/>
+          </a:ln>
+        </p:spPr>
+        <p:style>
+          <a:lnRef idx="2">
+            <a:schemeClr val="accent1">
+              <a:shade val="50000"/>
+            </a:schemeClr>
+          </a:lnRef>
+          <a:fillRef idx="1">
+            <a:schemeClr val="accent1"/>
+          </a:fillRef>
+          <a:effectRef idx="0">
+            <a:schemeClr val="accent1"/>
+          </a:effectRef>
+          <a:fontRef idx="minor">
+            <a:schemeClr val="lt1"/>
+          </a:fontRef>
+        </p:style>
+        <p:txBody>
+          <a:bodyPr rtlCol="0" anchor="ctr"/>
+          <a:p>
+            <a:pPr algn="ctr"/>
+            <a:endParaRPr lang="en-US"/>
+          </a:p>
+        </p:txBody>
+      </p:sp>
+      <p:pic>
+        <p:nvPicPr>
+          <p:cNvPr id="16" name="Picture 15" descr="one-step-logo"/>
+          <p:cNvPicPr>
+            <a:picLocks noChangeAspect="1"/>
+          </p:cNvPicPr>
+          <p:nvPr/>
+        </p:nvPicPr>
+        <p:blipFill>
+          <a:blip r:embed="rId1"/>
+          <a:stretch>
+            <a:fillRect/>
+          </a:stretch>
+        </p:blipFill>
+        <p:spPr>
+          <a:xfrm>
+            <a:off x="1891030" y="5990590"/>
+            <a:ext cx="1266825" cy="483870"/>
+          </a:xfrm>
+          <a:prstGeom prst="rect">
+            <a:avLst/>
+          </a:prstGeom>
+        </p:spPr>
+      </p:pic>
+      <p:pic>
+        <p:nvPicPr>
+          <p:cNvPr id="17" name="Picture 3" descr="Description: \\MICROSERVER\Mediastore\My Documents\My Documents\Logical View\Branding\Logo White.png"/>
+          <p:cNvPicPr>
+            <a:picLocks noChangeAspect="1" noChangeArrowheads="1"/>
+          </p:cNvPicPr>
+          <p:nvPr/>
+        </p:nvPicPr>
+        <p:blipFill>
+          <a:blip r:embed="rId2">
+            <a:clrChange>
+              <a:clrFrom>
+                <a:srgbClr val="FFFFFF"/>
+              </a:clrFrom>
+              <a:clrTo>
+                <a:srgbClr val="FFFFFF">
+                  <a:alpha val="0"/>
+                </a:srgbClr>
+              </a:clrTo>
+            </a:clrChange>
+            <a:extLst>
+              <a:ext uri="{28A0092B-C50C-407E-A947-70E740481C1C}">
+                <a14:useLocalDpi xmlns:a14="http://schemas.microsoft.com/office/drawing/2010/main" val="0"/>
+              </a:ext>
+            </a:extLst>
+          </a:blip>
+          <a:srcRect/>
+          <a:stretch>
+            <a:fillRect/>
+          </a:stretch>
+        </p:blipFill>
+        <p:spPr>
+          <a:xfrm>
+            <a:off x="148590" y="5866765"/>
+            <a:ext cx="1531620" cy="731520"/>
+          </a:xfrm>
+          <a:prstGeom prst="rect">
+            <a:avLst/>
+          </a:prstGeom>
+          <a:noFill/>
+        </p:spPr>
+      </p:pic>
+    </p:spTree>
+  </p:cSld>
+  <p:clrMapOvr>
+    <a:masterClrMapping/>
+  </p:clrMapOvr>
+  <p:transition/>
+</p:sld>
+</file>
+
+<file path=ppt/slides/slide2.xml><?xml version="1.0" encoding="utf-8"?>
 <p:sld xmlns:a="http://schemas.openxmlformats.org/drawingml/2006/main" xmlns:r="http://schemas.openxmlformats.org/officeDocument/2006/relationships" xmlns:p="http://schemas.openxmlformats.org/presentationml/2006/main">
   <p:cSld>
     <p:spTree>
@@ -3090,7 +3765,7 @@
             </a:gdLst>
             <a:ahLst/>
             <a:cxnLst>
-              <a:cxn ang="3cd4">
+              <a:cxn ang="3">
                 <a:pos x="hc" y="t"/>
               </a:cxn>
               <a:cxn ang="cd2">
@@ -3475,11 +4150,522 @@
           <a:noFill/>
         </p:spPr>
       </p:pic>
+      <p:sp>
+        <p:nvSpPr>
+          <p:cNvPr id="3" name="Text Box 2"/>
+          <p:cNvSpPr txBox="1"/>
+          <p:nvPr/>
+        </p:nvSpPr>
+        <p:spPr>
+          <a:xfrm>
+            <a:off x="457835" y="916940"/>
+            <a:ext cx="6943090" cy="1198880"/>
+          </a:xfrm>
+          <a:prstGeom prst="rect">
+            <a:avLst/>
+          </a:prstGeom>
+          <a:noFill/>
+        </p:spPr>
+        <p:txBody>
+          <a:bodyPr wrap="square" rtlCol="0">
+            <a:spAutoFit/>
+          </a:bodyPr>
+          <a:p>
+            <a:pPr algn="l">
+              <a:lnSpc>
+                <a:spcPct val="100000"/>
+              </a:lnSpc>
+            </a:pPr>
+            <a:r>
+              <a:rPr lang="en-US" sz="7200">
+                <a:solidFill>
+                  <a:srgbClr val="EBCED5"/>
+                </a:solidFill>
+                <a:latin typeface="FreeSans" panose="020B0504020202020204" charset="0"/>
+                <a:cs typeface="FreeSans" panose="020B0504020202020204" charset="0"/>
+              </a:rPr>
+              <a:t>1 S T E P</a:t>
+            </a:r>
+            <a:endParaRPr lang="en-US" sz="7200">
+              <a:solidFill>
+                <a:srgbClr val="EBCED5"/>
+              </a:solidFill>
+              <a:latin typeface="FreeSans" panose="020B0504020202020204" charset="0"/>
+              <a:cs typeface="FreeSans" panose="020B0504020202020204" charset="0"/>
+            </a:endParaRPr>
+          </a:p>
+        </p:txBody>
+      </p:sp>
+      <p:sp>
+        <p:nvSpPr>
+          <p:cNvPr id="4" name="Text Box 3"/>
+          <p:cNvSpPr txBox="1"/>
+          <p:nvPr/>
+        </p:nvSpPr>
+        <p:spPr>
+          <a:xfrm>
+            <a:off x="457835" y="2115820"/>
+            <a:ext cx="2921000" cy="460375"/>
+          </a:xfrm>
+          <a:prstGeom prst="rect">
+            <a:avLst/>
+          </a:prstGeom>
+          <a:noFill/>
+        </p:spPr>
+        <p:txBody>
+          <a:bodyPr wrap="square" rtlCol="0">
+            <a:spAutoFit/>
+          </a:bodyPr>
+          <a:p>
+            <a:r>
+              <a:rPr lang="en-US" sz="2400">
+                <a:solidFill>
+                  <a:schemeClr val="bg1"/>
+                </a:solidFill>
+                <a:latin typeface="FreeSans" panose="020B0504020202020204" charset="0"/>
+                <a:cs typeface="FreeSans" panose="020B0504020202020204" charset="0"/>
+              </a:rPr>
+              <a:t>By Lucy Gardener</a:t>
+            </a:r>
+            <a:endParaRPr lang="en-US" sz="2400">
+              <a:solidFill>
+                <a:schemeClr val="bg1"/>
+              </a:solidFill>
+              <a:latin typeface="FreeSans" panose="020B0504020202020204" charset="0"/>
+              <a:cs typeface="FreeSans" panose="020B0504020202020204" charset="0"/>
+            </a:endParaRPr>
+          </a:p>
+        </p:txBody>
+      </p:sp>
     </p:spTree>
   </p:cSld>
   <p:clrMapOvr>
     <a:masterClrMapping/>
   </p:clrMapOvr>
+</p:sld>
+</file>
+
+<file path=ppt/slides/slide3.xml><?xml version="1.0" encoding="utf-8"?>
+<p:sld xmlns:a="http://schemas.openxmlformats.org/drawingml/2006/main" xmlns:r="http://schemas.openxmlformats.org/officeDocument/2006/relationships" xmlns:p="http://schemas.openxmlformats.org/presentationml/2006/main">
+  <p:cSld>
+    <p:spTree>
+      <p:nvGrpSpPr>
+        <p:cNvPr id="1" name=""/>
+        <p:cNvGrpSpPr/>
+        <p:nvPr/>
+      </p:nvGrpSpPr>
+      <p:grpSpPr/>
+      <p:sp>
+        <p:nvSpPr>
+          <p:cNvPr id="10" name="Rectangles 9"/>
+          <p:cNvSpPr/>
+          <p:nvPr/>
+        </p:nvSpPr>
+        <p:spPr>
+          <a:xfrm>
+            <a:off x="-8890" y="-26035"/>
+            <a:ext cx="12299950" cy="175260"/>
+          </a:xfrm>
+          <a:prstGeom prst="rect">
+            <a:avLst/>
+          </a:prstGeom>
+          <a:solidFill>
+            <a:schemeClr val="accent4">
+              <a:lumMod val="75000"/>
+              <a:lumOff val="25000"/>
+            </a:schemeClr>
+          </a:solidFill>
+          <a:ln>
+            <a:noFill/>
+          </a:ln>
+        </p:spPr>
+        <p:style>
+          <a:lnRef idx="2">
+            <a:schemeClr val="accent1">
+              <a:shade val="50000"/>
+            </a:schemeClr>
+          </a:lnRef>
+          <a:fillRef idx="1">
+            <a:schemeClr val="accent1"/>
+          </a:fillRef>
+          <a:effectRef idx="0">
+            <a:schemeClr val="accent1"/>
+          </a:effectRef>
+          <a:fontRef idx="minor">
+            <a:schemeClr val="lt1"/>
+          </a:fontRef>
+        </p:style>
+        <p:txBody>
+          <a:bodyPr rtlCol="0" anchor="ctr"/>
+          <a:p>
+            <a:pPr algn="ctr"/>
+            <a:endParaRPr lang="en-US"/>
+          </a:p>
+        </p:txBody>
+      </p:sp>
+      <p:sp>
+        <p:nvSpPr>
+          <p:cNvPr id="11" name="Rectangles 10"/>
+          <p:cNvSpPr/>
+          <p:nvPr/>
+        </p:nvSpPr>
+        <p:spPr>
+          <a:xfrm rot="5400000">
+            <a:off x="5954395" y="6036310"/>
+            <a:ext cx="12299950" cy="175260"/>
+          </a:xfrm>
+          <a:prstGeom prst="rect">
+            <a:avLst/>
+          </a:prstGeom>
+          <a:solidFill>
+            <a:schemeClr val="accent4">
+              <a:lumMod val="75000"/>
+              <a:lumOff val="25000"/>
+            </a:schemeClr>
+          </a:solidFill>
+          <a:ln>
+            <a:noFill/>
+          </a:ln>
+        </p:spPr>
+        <p:style>
+          <a:lnRef idx="2">
+            <a:schemeClr val="accent1">
+              <a:shade val="50000"/>
+            </a:schemeClr>
+          </a:lnRef>
+          <a:fillRef idx="1">
+            <a:schemeClr val="accent1"/>
+          </a:fillRef>
+          <a:effectRef idx="0">
+            <a:schemeClr val="accent1"/>
+          </a:effectRef>
+          <a:fontRef idx="minor">
+            <a:schemeClr val="lt1"/>
+          </a:fontRef>
+        </p:style>
+        <p:txBody>
+          <a:bodyPr rtlCol="0" anchor="ctr"/>
+          <a:p>
+            <a:pPr algn="ctr"/>
+            <a:endParaRPr lang="en-US"/>
+          </a:p>
+        </p:txBody>
+      </p:sp>
+      <p:sp>
+        <p:nvSpPr>
+          <p:cNvPr id="12" name="Rectangles 11"/>
+          <p:cNvSpPr/>
+          <p:nvPr/>
+        </p:nvSpPr>
+        <p:spPr>
+          <a:xfrm>
+            <a:off x="-53975" y="6682740"/>
+            <a:ext cx="12299950" cy="175260"/>
+          </a:xfrm>
+          <a:prstGeom prst="rect">
+            <a:avLst/>
+          </a:prstGeom>
+          <a:solidFill>
+            <a:schemeClr val="accent4">
+              <a:lumMod val="75000"/>
+              <a:lumOff val="25000"/>
+            </a:schemeClr>
+          </a:solidFill>
+          <a:ln>
+            <a:noFill/>
+          </a:ln>
+        </p:spPr>
+        <p:style>
+          <a:lnRef idx="2">
+            <a:schemeClr val="accent1">
+              <a:shade val="50000"/>
+            </a:schemeClr>
+          </a:lnRef>
+          <a:fillRef idx="1">
+            <a:schemeClr val="accent1"/>
+          </a:fillRef>
+          <a:effectRef idx="0">
+            <a:schemeClr val="accent1"/>
+          </a:effectRef>
+          <a:fontRef idx="minor">
+            <a:schemeClr val="lt1"/>
+          </a:fontRef>
+        </p:style>
+        <p:txBody>
+          <a:bodyPr rtlCol="0" anchor="ctr"/>
+          <a:p>
+            <a:pPr algn="ctr"/>
+            <a:endParaRPr lang="en-US"/>
+          </a:p>
+        </p:txBody>
+      </p:sp>
+      <p:pic>
+        <p:nvPicPr>
+          <p:cNvPr id="16" name="Picture 15" descr="one-step-logo"/>
+          <p:cNvPicPr>
+            <a:picLocks noChangeAspect="1"/>
+          </p:cNvPicPr>
+          <p:nvPr/>
+        </p:nvPicPr>
+        <p:blipFill>
+          <a:blip r:embed="rId1"/>
+          <a:stretch>
+            <a:fillRect/>
+          </a:stretch>
+        </p:blipFill>
+        <p:spPr>
+          <a:xfrm>
+            <a:off x="1891030" y="5990590"/>
+            <a:ext cx="1266825" cy="483870"/>
+          </a:xfrm>
+          <a:prstGeom prst="rect">
+            <a:avLst/>
+          </a:prstGeom>
+        </p:spPr>
+      </p:pic>
+      <p:pic>
+        <p:nvPicPr>
+          <p:cNvPr id="17" name="Picture 3" descr="Description: \\MICROSERVER\Mediastore\My Documents\My Documents\Logical View\Branding\Logo White.png"/>
+          <p:cNvPicPr>
+            <a:picLocks noChangeAspect="1" noChangeArrowheads="1"/>
+          </p:cNvPicPr>
+          <p:nvPr/>
+        </p:nvPicPr>
+        <p:blipFill>
+          <a:blip r:embed="rId2">
+            <a:clrChange>
+              <a:clrFrom>
+                <a:srgbClr val="FFFFFF"/>
+              </a:clrFrom>
+              <a:clrTo>
+                <a:srgbClr val="FFFFFF">
+                  <a:alpha val="0"/>
+                </a:srgbClr>
+              </a:clrTo>
+            </a:clrChange>
+            <a:extLst>
+              <a:ext uri="{28A0092B-C50C-407E-A947-70E740481C1C}">
+                <a14:useLocalDpi xmlns:a14="http://schemas.microsoft.com/office/drawing/2010/main" val="0"/>
+              </a:ext>
+            </a:extLst>
+          </a:blip>
+          <a:srcRect/>
+          <a:stretch>
+            <a:fillRect/>
+          </a:stretch>
+        </p:blipFill>
+        <p:spPr>
+          <a:xfrm>
+            <a:off x="148590" y="5866765"/>
+            <a:ext cx="1531620" cy="731520"/>
+          </a:xfrm>
+          <a:prstGeom prst="rect">
+            <a:avLst/>
+          </a:prstGeom>
+          <a:noFill/>
+        </p:spPr>
+      </p:pic>
+      <p:sp>
+        <p:nvSpPr>
+          <p:cNvPr id="3" name="Text Box 2"/>
+          <p:cNvSpPr txBox="1"/>
+          <p:nvPr/>
+        </p:nvSpPr>
+        <p:spPr>
+          <a:xfrm>
+            <a:off x="2624455" y="149225"/>
+            <a:ext cx="6943090" cy="922020"/>
+          </a:xfrm>
+          <a:prstGeom prst="rect">
+            <a:avLst/>
+          </a:prstGeom>
+          <a:noFill/>
+        </p:spPr>
+        <p:txBody>
+          <a:bodyPr wrap="square" rtlCol="0">
+            <a:spAutoFit/>
+          </a:bodyPr>
+          <a:p>
+            <a:pPr algn="ctr">
+              <a:lnSpc>
+                <a:spcPct val="100000"/>
+              </a:lnSpc>
+            </a:pPr>
+            <a:r>
+              <a:rPr lang="en-US" sz="5400">
+                <a:solidFill>
+                  <a:srgbClr val="EBCED5"/>
+                </a:solidFill>
+                <a:latin typeface="FreeSans" panose="020B0504020202020204" charset="0"/>
+                <a:cs typeface="FreeSans" panose="020B0504020202020204" charset="0"/>
+              </a:rPr>
+              <a:t>MoodBoard</a:t>
+            </a:r>
+            <a:endParaRPr lang="en-US" sz="5400">
+              <a:solidFill>
+                <a:srgbClr val="EBCED5"/>
+              </a:solidFill>
+              <a:latin typeface="FreeSans" panose="020B0504020202020204" charset="0"/>
+              <a:cs typeface="FreeSans" panose="020B0504020202020204" charset="0"/>
+            </a:endParaRPr>
+          </a:p>
+        </p:txBody>
+      </p:sp>
+      <p:pic>
+        <p:nvPicPr>
+          <p:cNvPr id="4" name="Picture 3" descr="1Step-design-v0_1"/>
+          <p:cNvPicPr>
+            <a:picLocks noChangeAspect="1"/>
+          </p:cNvPicPr>
+          <p:nvPr/>
+        </p:nvPicPr>
+        <p:blipFill>
+          <a:blip r:embed="rId3"/>
+          <a:stretch>
+            <a:fillRect/>
+          </a:stretch>
+        </p:blipFill>
+        <p:spPr>
+          <a:xfrm>
+            <a:off x="2298065" y="1141730"/>
+            <a:ext cx="7686040" cy="4323715"/>
+          </a:xfrm>
+          <a:prstGeom prst="rect">
+            <a:avLst/>
+          </a:prstGeom>
+          <a:ln>
+            <a:noFill/>
+          </a:ln>
+          <a:effectLst>
+            <a:outerShdw blurRad="50800" dist="38100" dir="2700000" algn="tl" rotWithShape="0">
+              <a:schemeClr val="bg1">
+                <a:alpha val="40000"/>
+              </a:schemeClr>
+            </a:outerShdw>
+          </a:effectLst>
+        </p:spPr>
+      </p:pic>
+      <p:pic>
+        <p:nvPicPr>
+          <p:cNvPr id="5" name="Picture 4" descr="1Step-design-v1_0"/>
+          <p:cNvPicPr>
+            <a:picLocks noChangeAspect="1"/>
+          </p:cNvPicPr>
+          <p:nvPr/>
+        </p:nvPicPr>
+        <p:blipFill>
+          <a:blip r:embed="rId4"/>
+          <a:stretch>
+            <a:fillRect/>
+          </a:stretch>
+        </p:blipFill>
+        <p:spPr>
+          <a:xfrm>
+            <a:off x="2298700" y="1141730"/>
+            <a:ext cx="7685405" cy="4323080"/>
+          </a:xfrm>
+          <a:prstGeom prst="rect">
+            <a:avLst/>
+          </a:prstGeom>
+          <a:effectLst>
+            <a:outerShdw blurRad="50800" dist="38100" dir="2700000" algn="tl" rotWithShape="0">
+              <a:schemeClr val="bg1">
+                <a:alpha val="40000"/>
+              </a:schemeClr>
+            </a:outerShdw>
+            <a:softEdge rad="31750"/>
+          </a:effectLst>
+        </p:spPr>
+      </p:pic>
+    </p:spTree>
+  </p:cSld>
+  <p:clrMapOvr>
+    <a:masterClrMapping/>
+  </p:clrMapOvr>
+  <p:transition/>
+  <p:timing>
+    <p:tnLst>
+      <p:par>
+        <p:cTn id="1" dur="indefinite" restart="never" nodeType="tmRoot">
+          <p:childTnLst>
+            <p:seq concurrent="1" nextAc="seek">
+              <p:cTn id="2" dur="indefinite" nodeType="mainSeq">
+                <p:childTnLst>
+                  <p:par>
+                    <p:cTn id="3" fill="hold">
+                      <p:stCondLst>
+                        <p:cond delay="indefinite"/>
+                      </p:stCondLst>
+                      <p:childTnLst>
+                        <p:par>
+                          <p:cTn id="4" fill="hold">
+                            <p:stCondLst>
+                              <p:cond delay="0"/>
+                            </p:stCondLst>
+                            <p:childTnLst>
+                              <p:par>
+                                <p:cTn id="5" presetID="6" presetClass="entr" presetSubtype="16" fill="hold" nodeType="clickEffect">
+                                  <p:stCondLst>
+                                    <p:cond delay="0"/>
+                                  </p:stCondLst>
+                                  <p:childTnLst>
+                                    <p:set>
+                                      <p:cBhvr>
+                                        <p:cTn id="6" dur="1" fill="hold">
+                                          <p:stCondLst>
+                                            <p:cond delay="0"/>
+                                          </p:stCondLst>
+                                        </p:cTn>
+                                        <p:tgtEl>
+                                          <p:spTgt spid="5"/>
+                                        </p:tgtEl>
+                                        <p:attrNameLst>
+                                          <p:attrName>style.visibility</p:attrName>
+                                        </p:attrNameLst>
+                                      </p:cBhvr>
+                                      <p:to>
+                                        <p:strVal val="visible"/>
+                                      </p:to>
+                                    </p:set>
+                                    <p:animEffect transition="in" filter="circle(in)">
+                                      <p:cBhvr>
+                                        <p:cTn id="7" dur="2000"/>
+                                        <p:tgtEl>
+                                          <p:spTgt spid="5"/>
+                                        </p:tgtEl>
+                                      </p:cBhvr>
+                                    </p:animEffect>
+                                  </p:childTnLst>
+                                </p:cTn>
+                              </p:par>
+                            </p:childTnLst>
+                          </p:cTn>
+                        </p:par>
+                      </p:childTnLst>
+                    </p:cTn>
+                  </p:par>
+                </p:childTnLst>
+              </p:cTn>
+              <p:prevCondLst>
+                <p:cond evt="onPrev" delay="0">
+                  <p:tgtEl>
+                    <p:sldTgt/>
+                  </p:tgtEl>
+                </p:cond>
+              </p:prevCondLst>
+              <p:nextCondLst>
+                <p:cond evt="onNext" delay="0">
+                  <p:tgtEl>
+                    <p:sldTgt/>
+                  </p:tgtEl>
+                </p:cond>
+              </p:nextCondLst>
+            </p:seq>
+          </p:childTnLst>
+        </p:cTn>
+      </p:par>
+    </p:tnLst>
+  </p:timing>
 </p:sld>
 </file>
 
@@ -4174,4 +5360,263 @@
     </a:ext>
   </a:extLst>
 </a:theme>
+</file>
+
+<file path=ppt/theme/theme2.xml><?xml version="1.0" encoding="utf-8"?>
+<a:theme xmlns:a="http://schemas.openxmlformats.org/drawingml/2006/main" name="Office Theme">
+  <a:themeElements>
+    <a:clrScheme name="Office">
+      <a:dk1>
+        <a:sysClr val="windowText" lastClr="000000"/>
+      </a:dk1>
+      <a:lt1>
+        <a:sysClr val="window" lastClr="FFFFFF"/>
+      </a:lt1>
+      <a:dk2>
+        <a:srgbClr val="44546A"/>
+      </a:dk2>
+      <a:lt2>
+        <a:srgbClr val="E7E6E6"/>
+      </a:lt2>
+      <a:accent1>
+        <a:srgbClr val="5B9BD5"/>
+      </a:accent1>
+      <a:accent2>
+        <a:srgbClr val="ED7D31"/>
+      </a:accent2>
+      <a:accent3>
+        <a:srgbClr val="A5A5A5"/>
+      </a:accent3>
+      <a:accent4>
+        <a:srgbClr val="FFC000"/>
+      </a:accent4>
+      <a:accent5>
+        <a:srgbClr val="4472C4"/>
+      </a:accent5>
+      <a:accent6>
+        <a:srgbClr val="70AD47"/>
+      </a:accent6>
+      <a:hlink>
+        <a:srgbClr val="0563C1"/>
+      </a:hlink>
+      <a:folHlink>
+        <a:srgbClr val="954F72"/>
+      </a:folHlink>
+    </a:clrScheme>
+    <a:fontScheme name="Office">
+      <a:majorFont>
+        <a:latin typeface="Calibri Light"/>
+        <a:ea typeface=""/>
+        <a:cs typeface=""/>
+        <a:font script="Jpan" typeface="ＭＳ Ｐゴシック"/>
+        <a:font script="Hang" typeface="맑은 고딕"/>
+        <a:font script="Hans" typeface="宋体"/>
+        <a:font script="Hant" typeface="新細明體"/>
+        <a:font script="Arab" typeface="Times New Roman"/>
+        <a:font script="Hebr" typeface="Times New Roman"/>
+        <a:font script="Thai" typeface="Angsana New"/>
+        <a:font script="Ethi" typeface="Nyala"/>
+        <a:font script="Beng" typeface="Vrinda"/>
+        <a:font script="Gujr" typeface="Shruti"/>
+        <a:font script="Khmr" typeface="MoolBoran"/>
+        <a:font script="Knda" typeface="Tunga"/>
+        <a:font script="Guru" typeface="Raavi"/>
+        <a:font script="Cans" typeface="Euphemia"/>
+        <a:font script="Cher" typeface="Plantagenet Cherokee"/>
+        <a:font script="Yiii" typeface="Microsoft Yi Baiti"/>
+        <a:font script="Tibt" typeface="Microsoft Himalaya"/>
+        <a:font script="Thaa" typeface="MV Boli"/>
+        <a:font script="Deva" typeface="Mangal"/>
+        <a:font script="Telu" typeface="Gautami"/>
+        <a:font script="Taml" typeface="Latha"/>
+        <a:font script="Syrc" typeface="Estrangelo Edessa"/>
+        <a:font script="Orya" typeface="Kalinga"/>
+        <a:font script="Mlym" typeface="Kartika"/>
+        <a:font script="Laoo" typeface="DokChampa"/>
+        <a:font script="Sinh" typeface="Iskoola Pota"/>
+        <a:font script="Mong" typeface="Mongolian Baiti"/>
+        <a:font script="Viet" typeface="Times New Roman"/>
+        <a:font script="Uigh" typeface="Microsoft Uighur"/>
+        <a:font script="Geor" typeface="Sylfaen"/>
+      </a:majorFont>
+      <a:minorFont>
+        <a:latin typeface="Calibri"/>
+        <a:ea typeface=""/>
+        <a:cs typeface=""/>
+        <a:font script="Jpan" typeface="ＭＳ Ｐゴシック"/>
+        <a:font script="Hang" typeface="맑은 고딕"/>
+        <a:font script="Hans" typeface="宋体"/>
+        <a:font script="Hant" typeface="新細明體"/>
+        <a:font script="Arab" typeface="Arial"/>
+        <a:font script="Hebr" typeface="Arial"/>
+        <a:font script="Thai" typeface="Cordia New"/>
+        <a:font script="Ethi" typeface="Nyala"/>
+        <a:font script="Beng" typeface="Vrinda"/>
+        <a:font script="Gujr" typeface="Shruti"/>
+        <a:font script="Khmr" typeface="DaunPenh"/>
+        <a:font script="Knda" typeface="Tunga"/>
+        <a:font script="Guru" typeface="Raavi"/>
+        <a:font script="Cans" typeface="Euphemia"/>
+        <a:font script="Cher" typeface="Plantagenet Cherokee"/>
+        <a:font script="Yiii" typeface="Microsoft Yi Baiti"/>
+        <a:font script="Tibt" typeface="Microsoft Himalaya"/>
+        <a:font script="Thaa" typeface="MV Boli"/>
+        <a:font script="Deva" typeface="Mangal"/>
+        <a:font script="Telu" typeface="Gautami"/>
+        <a:font script="Taml" typeface="Latha"/>
+        <a:font script="Syrc" typeface="Estrangelo Edessa"/>
+        <a:font script="Orya" typeface="Kalinga"/>
+        <a:font script="Mlym" typeface="Kartika"/>
+        <a:font script="Laoo" typeface="DokChampa"/>
+        <a:font script="Sinh" typeface="Iskoola Pota"/>
+        <a:font script="Mong" typeface="Mongolian Baiti"/>
+        <a:font script="Viet" typeface="Arial"/>
+        <a:font script="Uigh" typeface="Microsoft Uighur"/>
+        <a:font script="Geor" typeface="Sylfaen"/>
+      </a:minorFont>
+    </a:fontScheme>
+    <a:fmtScheme name="Office">
+      <a:fillStyleLst>
+        <a:solidFill>
+          <a:schemeClr val="phClr"/>
+        </a:solidFill>
+        <a:gradFill rotWithShape="1">
+          <a:gsLst>
+            <a:gs pos="0">
+              <a:schemeClr val="phClr">
+                <a:lumMod val="110000"/>
+                <a:satMod val="105000"/>
+                <a:tint val="67000"/>
+              </a:schemeClr>
+            </a:gs>
+            <a:gs pos="50000">
+              <a:schemeClr val="phClr">
+                <a:lumMod val="105000"/>
+                <a:satMod val="103000"/>
+                <a:tint val="73000"/>
+              </a:schemeClr>
+            </a:gs>
+            <a:gs pos="100000">
+              <a:schemeClr val="phClr">
+                <a:lumMod val="105000"/>
+                <a:satMod val="109000"/>
+                <a:tint val="81000"/>
+              </a:schemeClr>
+            </a:gs>
+          </a:gsLst>
+          <a:lin ang="5400000" scaled="0"/>
+        </a:gradFill>
+        <a:gradFill rotWithShape="1">
+          <a:gsLst>
+            <a:gs pos="0">
+              <a:schemeClr val="phClr">
+                <a:satMod val="103000"/>
+                <a:lumMod val="102000"/>
+                <a:tint val="94000"/>
+              </a:schemeClr>
+            </a:gs>
+            <a:gs pos="50000">
+              <a:schemeClr val="phClr">
+                <a:satMod val="110000"/>
+                <a:lumMod val="100000"/>
+                <a:shade val="100000"/>
+              </a:schemeClr>
+            </a:gs>
+            <a:gs pos="100000">
+              <a:schemeClr val="phClr">
+                <a:lumMod val="99000"/>
+                <a:satMod val="120000"/>
+                <a:shade val="78000"/>
+              </a:schemeClr>
+            </a:gs>
+          </a:gsLst>
+          <a:lin ang="5400000" scaled="0"/>
+        </a:gradFill>
+      </a:fillStyleLst>
+      <a:lnStyleLst>
+        <a:ln w="6350" cap="flat" cmpd="sng" algn="ctr">
+          <a:solidFill>
+            <a:schemeClr val="phClr"/>
+          </a:solidFill>
+          <a:prstDash val="solid"/>
+          <a:miter lim="800000"/>
+        </a:ln>
+        <a:ln w="12700" cap="flat" cmpd="sng" algn="ctr">
+          <a:solidFill>
+            <a:schemeClr val="phClr"/>
+          </a:solidFill>
+          <a:prstDash val="solid"/>
+          <a:miter lim="800000"/>
+        </a:ln>
+        <a:ln w="19050" cap="flat" cmpd="sng" algn="ctr">
+          <a:solidFill>
+            <a:schemeClr val="phClr"/>
+          </a:solidFill>
+          <a:prstDash val="solid"/>
+          <a:miter lim="800000"/>
+        </a:ln>
+      </a:lnStyleLst>
+      <a:effectStyleLst>
+        <a:effectStyle>
+          <a:effectLst/>
+        </a:effectStyle>
+        <a:effectStyle>
+          <a:effectLst/>
+        </a:effectStyle>
+        <a:effectStyle>
+          <a:effectLst>
+            <a:outerShdw blurRad="57150" dist="19050" dir="5400000" algn="ctr" rotWithShape="0">
+              <a:srgbClr val="000000">
+                <a:alpha val="63000"/>
+              </a:srgbClr>
+            </a:outerShdw>
+          </a:effectLst>
+        </a:effectStyle>
+      </a:effectStyleLst>
+      <a:bgFillStyleLst>
+        <a:solidFill>
+          <a:schemeClr val="phClr"/>
+        </a:solidFill>
+        <a:solidFill>
+          <a:schemeClr val="phClr">
+            <a:tint val="95000"/>
+            <a:satMod val="170000"/>
+          </a:schemeClr>
+        </a:solidFill>
+        <a:gradFill rotWithShape="1">
+          <a:gsLst>
+            <a:gs pos="0">
+              <a:schemeClr val="phClr">
+                <a:tint val="93000"/>
+                <a:satMod val="150000"/>
+                <a:shade val="98000"/>
+                <a:lumMod val="102000"/>
+              </a:schemeClr>
+            </a:gs>
+            <a:gs pos="50000">
+              <a:schemeClr val="phClr">
+                <a:tint val="98000"/>
+                <a:satMod val="130000"/>
+                <a:shade val="90000"/>
+                <a:lumMod val="103000"/>
+              </a:schemeClr>
+            </a:gs>
+            <a:gs pos="100000">
+              <a:schemeClr val="phClr">
+                <a:shade val="63000"/>
+                <a:satMod val="120000"/>
+              </a:schemeClr>
+            </a:gs>
+          </a:gsLst>
+          <a:lin ang="5400000" scaled="0"/>
+        </a:gradFill>
+      </a:bgFillStyleLst>
+    </a:fmtScheme>
+  </a:themeElements>
+  <a:extLst>
+    <a:ext uri="{05A4C25C-085E-4340-85A3-A5531E510DB2}">
+      <thm15:themeFamily xmlns:thm15="http://schemas.microsoft.com/office/thememl/2012/main" name="Office Theme" id="{62F939B6-93AF-4DB8-9C6B-D6C7DFDC589F}" vid="{4A3C46E8-61CC-4603-A589-7422A47A8E4A}"/>
+    </a:ext>
+  </a:extLst>
+</a:theme>
 </file>
</xml_diff>